<commit_message>
add list of operators
</commit_message>
<xml_diff>
--- a/RXJS Make it easy/RXJS Make it easy.pptx
+++ b/RXJS Make it easy/RXJS Make it easy.pptx
@@ -6002,14 +6002,49 @@
                 <a:latin typeface="Times New Roman" panose="02020603050405020304" pitchFamily="18" charset="0"/>
                 <a:cs typeface="Times New Roman" panose="02020603050405020304" pitchFamily="18" charset="0"/>
               </a:rPr>
-              <a:t>switchMap</a:t>
+              <a:t>SwitchMap</a:t>
             </a:r>
             <a:r>
               <a:rPr lang="nl-NL" dirty="0">
                 <a:latin typeface="Times New Roman" panose="02020603050405020304" pitchFamily="18" charset="0"/>
                 <a:cs typeface="Times New Roman" panose="02020603050405020304" pitchFamily="18" charset="0"/>
               </a:rPr>
-              <a:t>, exhaustMap, mergeMap, concatMap</a:t>
+              <a:t>, </a:t>
+            </a:r>
+            <a:r>
+              <a:rPr lang="nl-NL" dirty="0" smtClean="0">
+                <a:latin typeface="Times New Roman" panose="02020603050405020304" pitchFamily="18" charset="0"/>
+                <a:cs typeface="Times New Roman" panose="02020603050405020304" pitchFamily="18" charset="0"/>
+              </a:rPr>
+              <a:t>ExhaustMap</a:t>
+            </a:r>
+            <a:r>
+              <a:rPr lang="nl-NL" dirty="0">
+                <a:latin typeface="Times New Roman" panose="02020603050405020304" pitchFamily="18" charset="0"/>
+                <a:cs typeface="Times New Roman" panose="02020603050405020304" pitchFamily="18" charset="0"/>
+              </a:rPr>
+              <a:t>, </a:t>
+            </a:r>
+            <a:r>
+              <a:rPr lang="nl-NL" dirty="0" smtClean="0">
+                <a:latin typeface="Times New Roman" panose="02020603050405020304" pitchFamily="18" charset="0"/>
+                <a:cs typeface="Times New Roman" panose="02020603050405020304" pitchFamily="18" charset="0"/>
+              </a:rPr>
+              <a:t>MergeMap</a:t>
+            </a:r>
+            <a:r>
+              <a:rPr lang="nl-NL">
+                <a:latin typeface="Times New Roman" panose="02020603050405020304" pitchFamily="18" charset="0"/>
+                <a:cs typeface="Times New Roman" panose="02020603050405020304" pitchFamily="18" charset="0"/>
+              </a:rPr>
+              <a:t>, </a:t>
+            </a:r>
+            <a:r>
+              <a:rPr lang="nl-NL" smtClean="0">
+                <a:latin typeface="Times New Roman" panose="02020603050405020304" pitchFamily="18" charset="0"/>
+                <a:cs typeface="Times New Roman" panose="02020603050405020304" pitchFamily="18" charset="0"/>
+              </a:rPr>
+              <a:t>ConcatMap</a:t>
             </a:r>
             <a:endParaRPr lang="nl-NL" dirty="0" smtClean="0">
               <a:latin typeface="Times New Roman" panose="02020603050405020304" pitchFamily="18" charset="0"/>
@@ -6422,32 +6457,32 @@
           <a:lstStyle/>
           <a:p>
             <a:r>
-              <a:rPr lang="nl-NL">
+              <a:rPr lang="nl-NL" dirty="0">
                 <a:latin typeface="Times New Roman" panose="02020603050405020304" pitchFamily="18" charset="0"/>
                 <a:cs typeface="Times New Roman" panose="02020603050405020304" pitchFamily="18" charset="0"/>
               </a:rPr>
               <a:t/>
             </a:r>
             <a:br>
-              <a:rPr lang="nl-NL">
+              <a:rPr lang="nl-NL" dirty="0">
                 <a:latin typeface="Times New Roman" panose="02020603050405020304" pitchFamily="18" charset="0"/>
                 <a:cs typeface="Times New Roman" panose="02020603050405020304" pitchFamily="18" charset="0"/>
               </a:rPr>
             </a:br>
             <a:r>
-              <a:rPr lang="nl-NL">
+              <a:rPr lang="nl-NL" dirty="0">
                 <a:latin typeface="Times New Roman" panose="02020603050405020304" pitchFamily="18" charset="0"/>
                 <a:cs typeface="Times New Roman" panose="02020603050405020304" pitchFamily="18" charset="0"/>
               </a:rPr>
               <a:t>Subject, BehaviorSubject, ReplaySubject, AsyncSubject</a:t>
             </a:r>
             <a:br>
-              <a:rPr lang="nl-NL">
+              <a:rPr lang="nl-NL" dirty="0">
                 <a:latin typeface="Times New Roman" panose="02020603050405020304" pitchFamily="18" charset="0"/>
                 <a:cs typeface="Times New Roman" panose="02020603050405020304" pitchFamily="18" charset="0"/>
               </a:rPr>
             </a:br>
-            <a:endParaRPr lang="en-US"/>
+            <a:endParaRPr lang="en-US" dirty="0"/>
           </a:p>
         </p:txBody>
       </p:sp>

</xml_diff>